<commit_message>
complete demo and error analysis
</commit_message>
<xml_diff>
--- a/images/custom_images.pptx
+++ b/images/custom_images.pptx
@@ -7,6 +7,7 @@
   <p:sldIdLst>
     <p:sldId id="256" r:id="rId2"/>
     <p:sldId id="257" r:id="rId3"/>
+    <p:sldId id="258" r:id="rId4"/>
   </p:sldIdLst>
   <p:sldSz cx="12192000" cy="6858000"/>
   <p:notesSz cx="6858000" cy="9144000"/>
@@ -105,6 +106,11 @@
       </a:defRPr>
     </a:lvl9pPr>
   </p:defaultTextStyle>
+  <p:extLst>
+    <p:ext uri="{EFAFB233-063F-42B5-8137-9DF3F51BA10A}">
+      <p15:sldGuideLst xmlns:p15="http://schemas.microsoft.com/office/powerpoint/2012/main"/>
+    </p:ext>
+  </p:extLst>
 </p:presentation>
 </file>
 
@@ -3874,6 +3880,145 @@
 </p:sld>
 </file>
 
+<file path=ppt/slides/slide3.xml><?xml version="1.0" encoding="utf-8"?>
+<p:sld xmlns:a="http://schemas.openxmlformats.org/drawingml/2006/main" xmlns:r="http://schemas.openxmlformats.org/officeDocument/2006/relationships" xmlns:p="http://schemas.openxmlformats.org/presentationml/2006/main">
+  <p:cSld>
+    <p:spTree>
+      <p:nvGrpSpPr>
+        <p:cNvPr id="1" name=""/>
+        <p:cNvGrpSpPr/>
+        <p:nvPr/>
+      </p:nvGrpSpPr>
+      <p:grpSpPr>
+        <a:xfrm>
+          <a:off x="0" y="0"/>
+          <a:ext cx="0" cy="0"/>
+          <a:chOff x="0" y="0"/>
+          <a:chExt cx="0" cy="0"/>
+        </a:xfrm>
+      </p:grpSpPr>
+      <p:grpSp>
+        <p:nvGrpSpPr>
+          <p:cNvPr id="12" name="Group 11">
+            <a:extLst>
+              <a:ext uri="{FF2B5EF4-FFF2-40B4-BE49-F238E27FC236}">
+                <a16:creationId xmlns:a16="http://schemas.microsoft.com/office/drawing/2014/main" id="{ED12CCFE-3A82-138A-BBBC-4C2517659B9A}"/>
+              </a:ext>
+            </a:extLst>
+          </p:cNvPr>
+          <p:cNvGrpSpPr/>
+          <p:nvPr/>
+        </p:nvGrpSpPr>
+        <p:grpSpPr>
+          <a:xfrm>
+            <a:off x="155225" y="1142340"/>
+            <a:ext cx="11881550" cy="4767805"/>
+            <a:chOff x="861199" y="763200"/>
+            <a:chExt cx="10871201" cy="4362374"/>
+          </a:xfrm>
+        </p:grpSpPr>
+        <p:pic>
+          <p:nvPicPr>
+            <p:cNvPr id="7" name="Picture 6" descr="Timeline&#10;&#10;Description automatically generated">
+              <a:extLst>
+                <a:ext uri="{FF2B5EF4-FFF2-40B4-BE49-F238E27FC236}">
+                  <a16:creationId xmlns:a16="http://schemas.microsoft.com/office/drawing/2014/main" id="{5DF6B081-955A-8E80-F905-348ECD661DAF}"/>
+                </a:ext>
+              </a:extLst>
+            </p:cNvPr>
+            <p:cNvPicPr>
+              <a:picLocks noChangeAspect="1"/>
+            </p:cNvPicPr>
+            <p:nvPr/>
+          </p:nvPicPr>
+          <p:blipFill>
+            <a:blip r:embed="rId2"/>
+            <a:stretch>
+              <a:fillRect/>
+            </a:stretch>
+          </p:blipFill>
+          <p:spPr>
+            <a:xfrm>
+              <a:off x="861199" y="3382080"/>
+              <a:ext cx="10871199" cy="1743494"/>
+            </a:xfrm>
+            <a:prstGeom prst="rect">
+              <a:avLst/>
+            </a:prstGeom>
+          </p:spPr>
+        </p:pic>
+        <p:pic>
+          <p:nvPicPr>
+            <p:cNvPr id="9" name="Picture 8" descr="A picture containing chart&#10;&#10;Description automatically generated">
+              <a:extLst>
+                <a:ext uri="{FF2B5EF4-FFF2-40B4-BE49-F238E27FC236}">
+                  <a16:creationId xmlns:a16="http://schemas.microsoft.com/office/drawing/2014/main" id="{4F09EE11-375B-B129-D7A5-B20F74515D9D}"/>
+                </a:ext>
+              </a:extLst>
+            </p:cNvPr>
+            <p:cNvPicPr>
+              <a:picLocks noChangeAspect="1"/>
+            </p:cNvPicPr>
+            <p:nvPr/>
+          </p:nvPicPr>
+          <p:blipFill rotWithShape="1">
+            <a:blip r:embed="rId3"/>
+            <a:srcRect b="24187"/>
+            <a:stretch/>
+          </p:blipFill>
+          <p:spPr>
+            <a:xfrm>
+              <a:off x="861200" y="763200"/>
+              <a:ext cx="10871200" cy="1309440"/>
+            </a:xfrm>
+            <a:prstGeom prst="rect">
+              <a:avLst/>
+            </a:prstGeom>
+          </p:spPr>
+        </p:pic>
+        <p:pic>
+          <p:nvPicPr>
+            <p:cNvPr id="11" name="Picture 10" descr="Chart, line chart&#10;&#10;Description automatically generated">
+              <a:extLst>
+                <a:ext uri="{FF2B5EF4-FFF2-40B4-BE49-F238E27FC236}">
+                  <a16:creationId xmlns:a16="http://schemas.microsoft.com/office/drawing/2014/main" id="{8CB1A2AE-BBF8-4596-B54C-3C453C1A7AE6}"/>
+                </a:ext>
+              </a:extLst>
+            </p:cNvPr>
+            <p:cNvPicPr>
+              <a:picLocks noChangeAspect="1"/>
+            </p:cNvPicPr>
+            <p:nvPr/>
+          </p:nvPicPr>
+          <p:blipFill rotWithShape="1">
+            <a:blip r:embed="rId4"/>
+            <a:srcRect b="24187"/>
+            <a:stretch/>
+          </p:blipFill>
+          <p:spPr>
+            <a:xfrm>
+              <a:off x="861200" y="2072640"/>
+              <a:ext cx="10871200" cy="1309440"/>
+            </a:xfrm>
+            <a:prstGeom prst="rect">
+              <a:avLst/>
+            </a:prstGeom>
+          </p:spPr>
+        </p:pic>
+      </p:grpSp>
+    </p:spTree>
+    <p:extLst>
+      <p:ext uri="{BB962C8B-B14F-4D97-AF65-F5344CB8AC3E}">
+        <p14:creationId xmlns:p14="http://schemas.microsoft.com/office/powerpoint/2010/main" val="491198793"/>
+      </p:ext>
+    </p:extLst>
+  </p:cSld>
+  <p:clrMapOvr>
+    <a:masterClrMapping/>
+  </p:clrMapOvr>
+</p:sld>
+</file>
+
 <file path=ppt/theme/theme1.xml><?xml version="1.0" encoding="utf-8"?>
 <a:theme xmlns:a="http://schemas.openxmlformats.org/drawingml/2006/main" name="Office Theme">
   <a:themeElements>

</xml_diff>